<commit_message>
up (xzl is too lazy to put in any commit msg)
</commit_message>
<xml_diff>
--- a/exp.pptx
+++ b/exp.pptx
@@ -6,6 +6,7 @@
   </p:sldMasterIdLst>
   <p:sldIdLst>
     <p:sldId id="256" r:id="rId2"/>
+    <p:sldId id="257" r:id="rId3"/>
   </p:sldIdLst>
   <p:sldSz cx="9144000" cy="6858000" type="screen4x3"/>
   <p:notesSz cx="6858000" cy="9144000"/>
@@ -254,7 +255,7 @@
           <a:p>
             <a:fld id="{38441453-FBCE-4BAF-AF1A-DEC143ECCC22}" type="datetimeFigureOut">
               <a:rPr lang="en-US" smtClean="0"/>
-              <a:t>7/15/2020</a:t>
+              <a:t>11/24/2020</a:t>
             </a:fld>
             <a:endParaRPr lang="en-US"/>
           </a:p>
@@ -424,7 +425,7 @@
           <a:p>
             <a:fld id="{38441453-FBCE-4BAF-AF1A-DEC143ECCC22}" type="datetimeFigureOut">
               <a:rPr lang="en-US" smtClean="0"/>
-              <a:t>7/15/2020</a:t>
+              <a:t>11/24/2020</a:t>
             </a:fld>
             <a:endParaRPr lang="en-US"/>
           </a:p>
@@ -604,7 +605,7 @@
           <a:p>
             <a:fld id="{38441453-FBCE-4BAF-AF1A-DEC143ECCC22}" type="datetimeFigureOut">
               <a:rPr lang="en-US" smtClean="0"/>
-              <a:t>7/15/2020</a:t>
+              <a:t>11/24/2020</a:t>
             </a:fld>
             <a:endParaRPr lang="en-US"/>
           </a:p>
@@ -774,7 +775,7 @@
           <a:p>
             <a:fld id="{38441453-FBCE-4BAF-AF1A-DEC143ECCC22}" type="datetimeFigureOut">
               <a:rPr lang="en-US" smtClean="0"/>
-              <a:t>7/15/2020</a:t>
+              <a:t>11/24/2020</a:t>
             </a:fld>
             <a:endParaRPr lang="en-US"/>
           </a:p>
@@ -1018,7 +1019,7 @@
           <a:p>
             <a:fld id="{38441453-FBCE-4BAF-AF1A-DEC143ECCC22}" type="datetimeFigureOut">
               <a:rPr lang="en-US" smtClean="0"/>
-              <a:t>7/15/2020</a:t>
+              <a:t>11/24/2020</a:t>
             </a:fld>
             <a:endParaRPr lang="en-US"/>
           </a:p>
@@ -1250,7 +1251,7 @@
           <a:p>
             <a:fld id="{38441453-FBCE-4BAF-AF1A-DEC143ECCC22}" type="datetimeFigureOut">
               <a:rPr lang="en-US" smtClean="0"/>
-              <a:t>7/15/2020</a:t>
+              <a:t>11/24/2020</a:t>
             </a:fld>
             <a:endParaRPr lang="en-US"/>
           </a:p>
@@ -1617,7 +1618,7 @@
           <a:p>
             <a:fld id="{38441453-FBCE-4BAF-AF1A-DEC143ECCC22}" type="datetimeFigureOut">
               <a:rPr lang="en-US" smtClean="0"/>
-              <a:t>7/15/2020</a:t>
+              <a:t>11/24/2020</a:t>
             </a:fld>
             <a:endParaRPr lang="en-US"/>
           </a:p>
@@ -1735,7 +1736,7 @@
           <a:p>
             <a:fld id="{38441453-FBCE-4BAF-AF1A-DEC143ECCC22}" type="datetimeFigureOut">
               <a:rPr lang="en-US" smtClean="0"/>
-              <a:t>7/15/2020</a:t>
+              <a:t>11/24/2020</a:t>
             </a:fld>
             <a:endParaRPr lang="en-US"/>
           </a:p>
@@ -1830,7 +1831,7 @@
           <a:p>
             <a:fld id="{38441453-FBCE-4BAF-AF1A-DEC143ECCC22}" type="datetimeFigureOut">
               <a:rPr lang="en-US" smtClean="0"/>
-              <a:t>7/15/2020</a:t>
+              <a:t>11/24/2020</a:t>
             </a:fld>
             <a:endParaRPr lang="en-US"/>
           </a:p>
@@ -2107,7 +2108,7 @@
           <a:p>
             <a:fld id="{38441453-FBCE-4BAF-AF1A-DEC143ECCC22}" type="datetimeFigureOut">
               <a:rPr lang="en-US" smtClean="0"/>
-              <a:t>7/15/2020</a:t>
+              <a:t>11/24/2020</a:t>
             </a:fld>
             <a:endParaRPr lang="en-US"/>
           </a:p>
@@ -2364,7 +2365,7 @@
           <a:p>
             <a:fld id="{38441453-FBCE-4BAF-AF1A-DEC143ECCC22}" type="datetimeFigureOut">
               <a:rPr lang="en-US" smtClean="0"/>
-              <a:t>7/15/2020</a:t>
+              <a:t>11/24/2020</a:t>
             </a:fld>
             <a:endParaRPr lang="en-US"/>
           </a:p>
@@ -2577,7 +2578,7 @@
           <a:p>
             <a:fld id="{38441453-FBCE-4BAF-AF1A-DEC143ECCC22}" type="datetimeFigureOut">
               <a:rPr lang="en-US" smtClean="0"/>
-              <a:t>7/15/2020</a:t>
+              <a:t>11/24/2020</a:t>
             </a:fld>
             <a:endParaRPr lang="en-US"/>
           </a:p>
@@ -2996,7 +2997,741 @@
         </p:nvSpPr>
         <p:spPr>
           <a:xfrm>
-            <a:off x="2000250" y="1981200"/>
+            <a:off x="2886075" y="1981200"/>
+            <a:ext cx="2019300" cy="2406650"/>
+          </a:xfrm>
+          <a:prstGeom prst="rect">
+            <a:avLst/>
+          </a:prstGeom>
+        </p:spPr>
+        <p:style>
+          <a:lnRef idx="2">
+            <a:schemeClr val="accent6">
+              <a:shade val="50000"/>
+            </a:schemeClr>
+          </a:lnRef>
+          <a:fillRef idx="1">
+            <a:schemeClr val="accent6"/>
+          </a:fillRef>
+          <a:effectRef idx="0">
+            <a:schemeClr val="accent6"/>
+          </a:effectRef>
+          <a:fontRef idx="minor">
+            <a:schemeClr val="lt1"/>
+          </a:fontRef>
+        </p:style>
+        <p:txBody>
+          <a:bodyPr rtlCol="0" anchor="ctr"/>
+          <a:lstStyle/>
+          <a:p>
+            <a:pPr algn="ctr"/>
+            <a:endParaRPr lang="en-US" dirty="0"/>
+          </a:p>
+          <a:p>
+            <a:pPr algn="ctr"/>
+            <a:endParaRPr lang="en-US" dirty="0"/>
+          </a:p>
+          <a:p>
+            <a:pPr algn="ctr"/>
+            <a:endParaRPr lang="en-US" dirty="0"/>
+          </a:p>
+          <a:p>
+            <a:pPr algn="ctr"/>
+            <a:endParaRPr lang="en-US" dirty="0"/>
+          </a:p>
+          <a:p>
+            <a:pPr algn="ctr"/>
+            <a:endParaRPr lang="en-US" dirty="0"/>
+          </a:p>
+          <a:p>
+            <a:pPr algn="ctr"/>
+            <a:endParaRPr lang="en-US" dirty="0"/>
+          </a:p>
+        </p:txBody>
+      </p:sp>
+      <p:sp>
+        <p:nvSpPr>
+          <p:cNvPr id="5" name="Rectangle 4">
+            <a:extLst>
+              <a:ext uri="{FF2B5EF4-FFF2-40B4-BE49-F238E27FC236}">
+                <a16:creationId xmlns:a16="http://schemas.microsoft.com/office/drawing/2014/main" id="{039F752D-4DE9-4149-81DD-1CCDC655FE48}"/>
+              </a:ext>
+            </a:extLst>
+          </p:cNvPr>
+          <p:cNvSpPr/>
+          <p:nvPr/>
+        </p:nvSpPr>
+        <p:spPr>
+          <a:xfrm>
+            <a:off x="4905375" y="1981200"/>
+            <a:ext cx="2019300" cy="2406650"/>
+          </a:xfrm>
+          <a:prstGeom prst="rect">
+            <a:avLst/>
+          </a:prstGeom>
+        </p:spPr>
+        <p:style>
+          <a:lnRef idx="2">
+            <a:schemeClr val="accent4">
+              <a:shade val="50000"/>
+            </a:schemeClr>
+          </a:lnRef>
+          <a:fillRef idx="1">
+            <a:schemeClr val="accent4"/>
+          </a:fillRef>
+          <a:effectRef idx="0">
+            <a:schemeClr val="accent4"/>
+          </a:effectRef>
+          <a:fontRef idx="minor">
+            <a:schemeClr val="lt1"/>
+          </a:fontRef>
+        </p:style>
+        <p:txBody>
+          <a:bodyPr rtlCol="0" anchor="ctr"/>
+          <a:lstStyle/>
+          <a:p>
+            <a:pPr algn="ctr"/>
+            <a:endParaRPr lang="en-US" dirty="0"/>
+          </a:p>
+          <a:p>
+            <a:pPr algn="ctr"/>
+            <a:endParaRPr lang="en-US" dirty="0"/>
+          </a:p>
+          <a:p>
+            <a:pPr algn="ctr"/>
+            <a:endParaRPr lang="en-US" dirty="0"/>
+          </a:p>
+          <a:p>
+            <a:pPr algn="ctr"/>
+            <a:endParaRPr lang="en-US" dirty="0"/>
+          </a:p>
+          <a:p>
+            <a:pPr algn="ctr"/>
+            <a:endParaRPr lang="en-US" dirty="0"/>
+          </a:p>
+          <a:p>
+            <a:pPr algn="ctr"/>
+            <a:endParaRPr lang="en-US" dirty="0"/>
+          </a:p>
+        </p:txBody>
+      </p:sp>
+      <p:sp>
+        <p:nvSpPr>
+          <p:cNvPr id="6" name="Rectangle 5">
+            <a:extLst>
+              <a:ext uri="{FF2B5EF4-FFF2-40B4-BE49-F238E27FC236}">
+                <a16:creationId xmlns:a16="http://schemas.microsoft.com/office/drawing/2014/main" id="{0D2CEFFC-C9A7-49E4-93F6-B4CFE6424771}"/>
+              </a:ext>
+            </a:extLst>
+          </p:cNvPr>
+          <p:cNvSpPr/>
+          <p:nvPr/>
+        </p:nvSpPr>
+        <p:spPr>
+          <a:xfrm>
+            <a:off x="5105401" y="2888357"/>
+            <a:ext cx="1619250" cy="533400"/>
+          </a:xfrm>
+          <a:prstGeom prst="rect">
+            <a:avLst/>
+          </a:prstGeom>
+        </p:spPr>
+        <p:style>
+          <a:lnRef idx="2">
+            <a:schemeClr val="dk1">
+              <a:shade val="50000"/>
+            </a:schemeClr>
+          </a:lnRef>
+          <a:fillRef idx="1">
+            <a:schemeClr val="dk1"/>
+          </a:fillRef>
+          <a:effectRef idx="0">
+            <a:schemeClr val="dk1"/>
+          </a:effectRef>
+          <a:fontRef idx="minor">
+            <a:schemeClr val="lt1"/>
+          </a:fontRef>
+        </p:style>
+        <p:txBody>
+          <a:bodyPr rtlCol="0" anchor="ctr"/>
+          <a:lstStyle/>
+          <a:p>
+            <a:pPr algn="ctr"/>
+            <a:r>
+              <a:rPr lang="en-US" dirty="0"/>
+              <a:t>Computer vision</a:t>
+            </a:r>
+          </a:p>
+        </p:txBody>
+      </p:sp>
+      <p:sp>
+        <p:nvSpPr>
+          <p:cNvPr id="7" name="TextBox 6">
+            <a:extLst>
+              <a:ext uri="{FF2B5EF4-FFF2-40B4-BE49-F238E27FC236}">
+                <a16:creationId xmlns:a16="http://schemas.microsoft.com/office/drawing/2014/main" id="{B77C5F06-9C6C-4220-938E-9C22047846D5}"/>
+              </a:ext>
+            </a:extLst>
+          </p:cNvPr>
+          <p:cNvSpPr txBox="1"/>
+          <p:nvPr/>
+        </p:nvSpPr>
+        <p:spPr>
+          <a:xfrm>
+            <a:off x="448067" y="2056884"/>
+            <a:ext cx="2184042" cy="923330"/>
+          </a:xfrm>
+          <a:prstGeom prst="rect">
+            <a:avLst/>
+          </a:prstGeom>
+          <a:noFill/>
+        </p:spPr>
+        <p:txBody>
+          <a:bodyPr wrap="square" rtlCol="0">
+            <a:spAutoFit/>
+          </a:bodyPr>
+          <a:lstStyle/>
+          <a:p>
+            <a:pPr algn="ctr"/>
+            <a:r>
+              <a:rPr lang="en-US" b="1" dirty="0"/>
+              <a:t>Encrypted images</a:t>
+            </a:r>
+          </a:p>
+          <a:p>
+            <a:pPr algn="ctr"/>
+            <a:r>
+              <a:rPr lang="en-US" dirty="0">
+                <a:solidFill>
+                  <a:schemeClr val="bg1">
+                    <a:lumMod val="65000"/>
+                  </a:schemeClr>
+                </a:solidFill>
+              </a:rPr>
+              <a:t>by a trusted party, e.g. a server</a:t>
+            </a:r>
+          </a:p>
+        </p:txBody>
+      </p:sp>
+      <p:sp>
+        <p:nvSpPr>
+          <p:cNvPr id="8" name="TextBox 7">
+            <a:extLst>
+              <a:ext uri="{FF2B5EF4-FFF2-40B4-BE49-F238E27FC236}">
+                <a16:creationId xmlns:a16="http://schemas.microsoft.com/office/drawing/2014/main" id="{22D5FA36-845B-40BF-BA21-CE6EA88CABA8}"/>
+              </a:ext>
+            </a:extLst>
+          </p:cNvPr>
+          <p:cNvSpPr txBox="1"/>
+          <p:nvPr/>
+        </p:nvSpPr>
+        <p:spPr>
+          <a:xfrm>
+            <a:off x="530438" y="3416122"/>
+            <a:ext cx="2019300" cy="923330"/>
+          </a:xfrm>
+          <a:prstGeom prst="rect">
+            <a:avLst/>
+          </a:prstGeom>
+          <a:noFill/>
+        </p:spPr>
+        <p:txBody>
+          <a:bodyPr wrap="square" rtlCol="0">
+            <a:spAutoFit/>
+          </a:bodyPr>
+          <a:lstStyle/>
+          <a:p>
+            <a:pPr algn="ctr"/>
+            <a:r>
+              <a:rPr lang="en-US" b="1" dirty="0"/>
+              <a:t>Encrypted results</a:t>
+            </a:r>
+            <a:r>
+              <a:rPr lang="en-US" dirty="0"/>
+              <a:t> </a:t>
+            </a:r>
+          </a:p>
+          <a:p>
+            <a:pPr algn="ctr"/>
+            <a:r>
+              <a:rPr lang="en-US" dirty="0">
+                <a:solidFill>
+                  <a:schemeClr val="bg1">
+                    <a:lumMod val="65000"/>
+                  </a:schemeClr>
+                </a:solidFill>
+              </a:rPr>
+              <a:t>to be decrypted by a trusted party</a:t>
+            </a:r>
+          </a:p>
+        </p:txBody>
+      </p:sp>
+      <p:sp>
+        <p:nvSpPr>
+          <p:cNvPr id="9" name="TextBox 8">
+            <a:extLst>
+              <a:ext uri="{FF2B5EF4-FFF2-40B4-BE49-F238E27FC236}">
+                <a16:creationId xmlns:a16="http://schemas.microsoft.com/office/drawing/2014/main" id="{540B1BB6-1D73-4F70-B6AC-04AB2FED1302}"/>
+              </a:ext>
+            </a:extLst>
+          </p:cNvPr>
+          <p:cNvSpPr txBox="1"/>
+          <p:nvPr/>
+        </p:nvSpPr>
+        <p:spPr>
+          <a:xfrm>
+            <a:off x="4199284" y="4410313"/>
+            <a:ext cx="1823320" cy="369332"/>
+          </a:xfrm>
+          <a:prstGeom prst="rect">
+            <a:avLst/>
+          </a:prstGeom>
+          <a:noFill/>
+        </p:spPr>
+        <p:txBody>
+          <a:bodyPr wrap="none" rtlCol="0">
+            <a:spAutoFit/>
+          </a:bodyPr>
+          <a:lstStyle/>
+          <a:p>
+            <a:r>
+              <a:rPr lang="en-US" dirty="0"/>
+              <a:t>The test platform</a:t>
+            </a:r>
+          </a:p>
+        </p:txBody>
+      </p:sp>
+      <p:sp>
+        <p:nvSpPr>
+          <p:cNvPr id="10" name="Rectangle 9">
+            <a:extLst>
+              <a:ext uri="{FF2B5EF4-FFF2-40B4-BE49-F238E27FC236}">
+                <a16:creationId xmlns:a16="http://schemas.microsoft.com/office/drawing/2014/main" id="{11D4EA4A-E39A-4591-BEF3-F40074F24C12}"/>
+              </a:ext>
+            </a:extLst>
+          </p:cNvPr>
+          <p:cNvSpPr/>
+          <p:nvPr/>
+        </p:nvSpPr>
+        <p:spPr>
+          <a:xfrm>
+            <a:off x="5105401" y="2056884"/>
+            <a:ext cx="1619250" cy="533400"/>
+          </a:xfrm>
+          <a:prstGeom prst="rect">
+            <a:avLst/>
+          </a:prstGeom>
+        </p:spPr>
+        <p:style>
+          <a:lnRef idx="2">
+            <a:schemeClr val="dk1">
+              <a:shade val="50000"/>
+            </a:schemeClr>
+          </a:lnRef>
+          <a:fillRef idx="1">
+            <a:schemeClr val="dk1"/>
+          </a:fillRef>
+          <a:effectRef idx="0">
+            <a:schemeClr val="dk1"/>
+          </a:effectRef>
+          <a:fontRef idx="minor">
+            <a:schemeClr val="lt1"/>
+          </a:fontRef>
+        </p:style>
+        <p:txBody>
+          <a:bodyPr rtlCol="0" anchor="ctr"/>
+          <a:lstStyle/>
+          <a:p>
+            <a:pPr algn="ctr"/>
+            <a:r>
+              <a:rPr lang="en-US" dirty="0"/>
+              <a:t>decrypt</a:t>
+            </a:r>
+          </a:p>
+        </p:txBody>
+      </p:sp>
+      <p:sp>
+        <p:nvSpPr>
+          <p:cNvPr id="2" name="Arrow: Right 1">
+            <a:extLst>
+              <a:ext uri="{FF2B5EF4-FFF2-40B4-BE49-F238E27FC236}">
+                <a16:creationId xmlns:a16="http://schemas.microsoft.com/office/drawing/2014/main" id="{6B9075DF-6B6D-4201-B67D-03608736C0BE}"/>
+              </a:ext>
+            </a:extLst>
+          </p:cNvPr>
+          <p:cNvSpPr/>
+          <p:nvPr/>
+        </p:nvSpPr>
+        <p:spPr>
+          <a:xfrm>
+            <a:off x="2543175" y="2156599"/>
+            <a:ext cx="2562226" cy="361950"/>
+          </a:xfrm>
+          <a:prstGeom prst="rightArrow">
+            <a:avLst/>
+          </a:prstGeom>
+          <a:solidFill>
+            <a:schemeClr val="bg1"/>
+          </a:solidFill>
+          <a:ln>
+            <a:solidFill>
+              <a:schemeClr val="tx1"/>
+            </a:solidFill>
+          </a:ln>
+        </p:spPr>
+        <p:style>
+          <a:lnRef idx="2">
+            <a:schemeClr val="accent1">
+              <a:shade val="50000"/>
+            </a:schemeClr>
+          </a:lnRef>
+          <a:fillRef idx="1">
+            <a:schemeClr val="accent1"/>
+          </a:fillRef>
+          <a:effectRef idx="0">
+            <a:schemeClr val="accent1"/>
+          </a:effectRef>
+          <a:fontRef idx="minor">
+            <a:schemeClr val="lt1"/>
+          </a:fontRef>
+        </p:style>
+        <p:txBody>
+          <a:bodyPr rtlCol="0" anchor="ctr"/>
+          <a:lstStyle/>
+          <a:p>
+            <a:pPr algn="ctr"/>
+            <a:endParaRPr lang="en-US"/>
+          </a:p>
+        </p:txBody>
+      </p:sp>
+      <p:sp>
+        <p:nvSpPr>
+          <p:cNvPr id="11" name="Arrow: Right 10">
+            <a:extLst>
+              <a:ext uri="{FF2B5EF4-FFF2-40B4-BE49-F238E27FC236}">
+                <a16:creationId xmlns:a16="http://schemas.microsoft.com/office/drawing/2014/main" id="{5F89A9EB-7CE6-4512-B5FD-E741780B863F}"/>
+              </a:ext>
+            </a:extLst>
+          </p:cNvPr>
+          <p:cNvSpPr/>
+          <p:nvPr/>
+        </p:nvSpPr>
+        <p:spPr>
+          <a:xfrm rot="5400000">
+            <a:off x="5737349" y="2593727"/>
+            <a:ext cx="368836" cy="361950"/>
+          </a:xfrm>
+          <a:prstGeom prst="rightArrow">
+            <a:avLst/>
+          </a:prstGeom>
+          <a:solidFill>
+            <a:schemeClr val="bg1"/>
+          </a:solidFill>
+          <a:ln>
+            <a:solidFill>
+              <a:schemeClr val="tx1"/>
+            </a:solidFill>
+          </a:ln>
+        </p:spPr>
+        <p:style>
+          <a:lnRef idx="2">
+            <a:schemeClr val="accent1">
+              <a:shade val="50000"/>
+            </a:schemeClr>
+          </a:lnRef>
+          <a:fillRef idx="1">
+            <a:schemeClr val="accent1"/>
+          </a:fillRef>
+          <a:effectRef idx="0">
+            <a:schemeClr val="accent1"/>
+          </a:effectRef>
+          <a:fontRef idx="minor">
+            <a:schemeClr val="lt1"/>
+          </a:fontRef>
+        </p:style>
+        <p:txBody>
+          <a:bodyPr rtlCol="0" anchor="ctr"/>
+          <a:lstStyle/>
+          <a:p>
+            <a:pPr algn="ctr"/>
+            <a:endParaRPr lang="en-US"/>
+          </a:p>
+        </p:txBody>
+      </p:sp>
+      <p:sp>
+        <p:nvSpPr>
+          <p:cNvPr id="12" name="TextBox 11">
+            <a:extLst>
+              <a:ext uri="{FF2B5EF4-FFF2-40B4-BE49-F238E27FC236}">
+                <a16:creationId xmlns:a16="http://schemas.microsoft.com/office/drawing/2014/main" id="{F665BCB9-9326-4F70-B691-5B503683D1DC}"/>
+              </a:ext>
+            </a:extLst>
+          </p:cNvPr>
+          <p:cNvSpPr txBox="1"/>
+          <p:nvPr/>
+        </p:nvSpPr>
+        <p:spPr>
+          <a:xfrm>
+            <a:off x="1708150" y="4060993"/>
+            <a:ext cx="4572000" cy="369332"/>
+          </a:xfrm>
+          <a:prstGeom prst="rect">
+            <a:avLst/>
+          </a:prstGeom>
+          <a:noFill/>
+        </p:spPr>
+        <p:txBody>
+          <a:bodyPr wrap="square">
+            <a:spAutoFit/>
+          </a:bodyPr>
+          <a:lstStyle/>
+          <a:p>
+            <a:pPr algn="ctr"/>
+            <a:r>
+              <a:rPr lang="en-US" dirty="0"/>
+              <a:t>Normal world</a:t>
+            </a:r>
+          </a:p>
+        </p:txBody>
+      </p:sp>
+      <p:sp>
+        <p:nvSpPr>
+          <p:cNvPr id="14" name="TextBox 13">
+            <a:extLst>
+              <a:ext uri="{FF2B5EF4-FFF2-40B4-BE49-F238E27FC236}">
+                <a16:creationId xmlns:a16="http://schemas.microsoft.com/office/drawing/2014/main" id="{78CCD86C-0DB1-4F3E-A877-78FD674CAE27}"/>
+              </a:ext>
+            </a:extLst>
+          </p:cNvPr>
+          <p:cNvSpPr txBox="1"/>
+          <p:nvPr/>
+        </p:nvSpPr>
+        <p:spPr>
+          <a:xfrm>
+            <a:off x="3656804" y="4053611"/>
+            <a:ext cx="4572000" cy="369332"/>
+          </a:xfrm>
+          <a:prstGeom prst="rect">
+            <a:avLst/>
+          </a:prstGeom>
+          <a:noFill/>
+        </p:spPr>
+        <p:txBody>
+          <a:bodyPr wrap="square">
+            <a:spAutoFit/>
+          </a:bodyPr>
+          <a:lstStyle/>
+          <a:p>
+            <a:pPr algn="ctr"/>
+            <a:r>
+              <a:rPr lang="en-US" dirty="0"/>
+              <a:t>Secure world</a:t>
+            </a:r>
+          </a:p>
+        </p:txBody>
+      </p:sp>
+      <p:sp>
+        <p:nvSpPr>
+          <p:cNvPr id="15" name="Rectangle 14">
+            <a:extLst>
+              <a:ext uri="{FF2B5EF4-FFF2-40B4-BE49-F238E27FC236}">
+                <a16:creationId xmlns:a16="http://schemas.microsoft.com/office/drawing/2014/main" id="{2507E1EC-B4A0-4FB2-9F50-0E30DAAB5D34}"/>
+              </a:ext>
+            </a:extLst>
+          </p:cNvPr>
+          <p:cNvSpPr/>
+          <p:nvPr/>
+        </p:nvSpPr>
+        <p:spPr>
+          <a:xfrm>
+            <a:off x="5105400" y="3634383"/>
+            <a:ext cx="1619250" cy="420608"/>
+          </a:xfrm>
+          <a:prstGeom prst="rect">
+            <a:avLst/>
+          </a:prstGeom>
+        </p:spPr>
+        <p:style>
+          <a:lnRef idx="2">
+            <a:schemeClr val="dk1">
+              <a:shade val="50000"/>
+            </a:schemeClr>
+          </a:lnRef>
+          <a:fillRef idx="1">
+            <a:schemeClr val="dk1"/>
+          </a:fillRef>
+          <a:effectRef idx="0">
+            <a:schemeClr val="dk1"/>
+          </a:effectRef>
+          <a:fontRef idx="minor">
+            <a:schemeClr val="lt1"/>
+          </a:fontRef>
+        </p:style>
+        <p:txBody>
+          <a:bodyPr rtlCol="0" anchor="ctr"/>
+          <a:lstStyle/>
+          <a:p>
+            <a:pPr algn="ctr"/>
+            <a:r>
+              <a:rPr lang="en-US" dirty="0"/>
+              <a:t>encrypt</a:t>
+            </a:r>
+          </a:p>
+        </p:txBody>
+      </p:sp>
+      <p:sp>
+        <p:nvSpPr>
+          <p:cNvPr id="16" name="Arrow: Right 15">
+            <a:extLst>
+              <a:ext uri="{FF2B5EF4-FFF2-40B4-BE49-F238E27FC236}">
+                <a16:creationId xmlns:a16="http://schemas.microsoft.com/office/drawing/2014/main" id="{5C45B42C-10A5-458F-96A7-BDA1043C1985}"/>
+              </a:ext>
+            </a:extLst>
+          </p:cNvPr>
+          <p:cNvSpPr/>
+          <p:nvPr/>
+        </p:nvSpPr>
+        <p:spPr>
+          <a:xfrm rot="5400000">
+            <a:off x="5737349" y="3433912"/>
+            <a:ext cx="368836" cy="361950"/>
+          </a:xfrm>
+          <a:prstGeom prst="rightArrow">
+            <a:avLst/>
+          </a:prstGeom>
+          <a:solidFill>
+            <a:schemeClr val="bg1"/>
+          </a:solidFill>
+          <a:ln>
+            <a:solidFill>
+              <a:schemeClr val="tx1"/>
+            </a:solidFill>
+          </a:ln>
+        </p:spPr>
+        <p:style>
+          <a:lnRef idx="2">
+            <a:schemeClr val="accent1">
+              <a:shade val="50000"/>
+            </a:schemeClr>
+          </a:lnRef>
+          <a:fillRef idx="1">
+            <a:schemeClr val="accent1"/>
+          </a:fillRef>
+          <a:effectRef idx="0">
+            <a:schemeClr val="accent1"/>
+          </a:effectRef>
+          <a:fontRef idx="minor">
+            <a:schemeClr val="lt1"/>
+          </a:fontRef>
+        </p:style>
+        <p:txBody>
+          <a:bodyPr rtlCol="0" anchor="ctr"/>
+          <a:lstStyle/>
+          <a:p>
+            <a:pPr algn="ctr"/>
+            <a:endParaRPr lang="en-US"/>
+          </a:p>
+        </p:txBody>
+      </p:sp>
+      <p:sp>
+        <p:nvSpPr>
+          <p:cNvPr id="17" name="Arrow: Right 16">
+            <a:extLst>
+              <a:ext uri="{FF2B5EF4-FFF2-40B4-BE49-F238E27FC236}">
+                <a16:creationId xmlns:a16="http://schemas.microsoft.com/office/drawing/2014/main" id="{3407098B-E525-4FAB-93B0-291D6B204D17}"/>
+              </a:ext>
+            </a:extLst>
+          </p:cNvPr>
+          <p:cNvSpPr/>
+          <p:nvPr/>
+        </p:nvSpPr>
+        <p:spPr>
+          <a:xfrm rot="10800000">
+            <a:off x="2520158" y="3657719"/>
+            <a:ext cx="2585242" cy="361950"/>
+          </a:xfrm>
+          <a:prstGeom prst="rightArrow">
+            <a:avLst/>
+          </a:prstGeom>
+          <a:solidFill>
+            <a:schemeClr val="bg1"/>
+          </a:solidFill>
+          <a:ln>
+            <a:solidFill>
+              <a:schemeClr val="tx1"/>
+            </a:solidFill>
+          </a:ln>
+        </p:spPr>
+        <p:style>
+          <a:lnRef idx="2">
+            <a:schemeClr val="accent1">
+              <a:shade val="50000"/>
+            </a:schemeClr>
+          </a:lnRef>
+          <a:fillRef idx="1">
+            <a:schemeClr val="accent1"/>
+          </a:fillRef>
+          <a:effectRef idx="0">
+            <a:schemeClr val="accent1"/>
+          </a:effectRef>
+          <a:fontRef idx="minor">
+            <a:schemeClr val="lt1"/>
+          </a:fontRef>
+        </p:style>
+        <p:txBody>
+          <a:bodyPr rtlCol="0" anchor="ctr"/>
+          <a:lstStyle/>
+          <a:p>
+            <a:pPr algn="ctr"/>
+            <a:endParaRPr lang="en-US"/>
+          </a:p>
+        </p:txBody>
+      </p:sp>
+    </p:spTree>
+    <p:extLst>
+      <p:ext uri="{BB962C8B-B14F-4D97-AF65-F5344CB8AC3E}">
+        <p14:creationId xmlns:p14="http://schemas.microsoft.com/office/powerpoint/2010/main" val="292368399"/>
+      </p:ext>
+    </p:extLst>
+  </p:cSld>
+  <p:clrMapOvr>
+    <a:masterClrMapping/>
+  </p:clrMapOvr>
+</p:sld>
+</file>
+
+<file path=ppt/slides/slide2.xml><?xml version="1.0" encoding="utf-8"?>
+<p:sld xmlns:a="http://schemas.openxmlformats.org/drawingml/2006/main" xmlns:r="http://schemas.openxmlformats.org/officeDocument/2006/relationships" xmlns:p="http://schemas.openxmlformats.org/presentationml/2006/main">
+  <p:cSld>
+    <p:spTree>
+      <p:nvGrpSpPr>
+        <p:cNvPr id="1" name=""/>
+        <p:cNvGrpSpPr/>
+        <p:nvPr/>
+      </p:nvGrpSpPr>
+      <p:grpSpPr>
+        <a:xfrm>
+          <a:off x="0" y="0"/>
+          <a:ext cx="0" cy="0"/>
+          <a:chOff x="0" y="0"/>
+          <a:chExt cx="0" cy="0"/>
+        </a:xfrm>
+      </p:grpSpPr>
+      <p:sp>
+        <p:nvSpPr>
+          <p:cNvPr id="4" name="Rectangle 3">
+            <a:extLst>
+              <a:ext uri="{FF2B5EF4-FFF2-40B4-BE49-F238E27FC236}">
+                <a16:creationId xmlns:a16="http://schemas.microsoft.com/office/drawing/2014/main" id="{5A73D72B-A3FB-41E4-BEF1-A5ED7A8F32FC}"/>
+              </a:ext>
+            </a:extLst>
+          </p:cNvPr>
+          <p:cNvSpPr/>
+          <p:nvPr/>
+        </p:nvSpPr>
+        <p:spPr>
+          <a:xfrm>
+            <a:off x="2886075" y="1981200"/>
             <a:ext cx="2019300" cy="2238375"/>
           </a:xfrm>
           <a:prstGeom prst="rect">
@@ -3143,7 +3878,7 @@
         </p:nvSpPr>
         <p:spPr>
           <a:xfrm>
-            <a:off x="3619500" y="1943100"/>
+            <a:off x="140057" y="1943100"/>
             <a:ext cx="1847493" cy="369332"/>
           </a:xfrm>
           <a:prstGeom prst="rect">
@@ -3202,7 +3937,7 @@
     </p:spTree>
     <p:extLst>
       <p:ext uri="{BB962C8B-B14F-4D97-AF65-F5344CB8AC3E}">
-        <p14:creationId xmlns:p14="http://schemas.microsoft.com/office/powerpoint/2010/main" val="292368399"/>
+        <p14:creationId xmlns:p14="http://schemas.microsoft.com/office/powerpoint/2010/main" val="1155239510"/>
       </p:ext>
     </p:extLst>
   </p:cSld>

</xml_diff>